<commit_message>
New MX4PC powerpoint with images
</commit_message>
<xml_diff>
--- a/content/developerportal/deploy/attachments/private-cloud/mx4pc-environments.pptx
+++ b/content/developerportal/deploy/attachments/private-cloud/mx4pc-environments.pptx
@@ -7,6 +7,7 @@
   <p:sldIdLst>
     <p:sldId id="257" r:id="rId2"/>
     <p:sldId id="258" r:id="rId3"/>
+    <p:sldId id="259" r:id="rId4"/>
   </p:sldIdLst>
   <p:sldSz cx="12192000" cy="6858000"/>
   <p:notesSz cx="6858000" cy="9144000"/>
@@ -271,7 +272,7 @@
           <a:p>
             <a:fld id="{FF9B6578-E6E0-4B07-A692-B6456D942F2F}" type="datetimeFigureOut">
               <a:rPr lang="en-US" smtClean="0"/>
-              <a:t>6/8/2020</a:t>
+              <a:t>9/15/2021</a:t>
             </a:fld>
             <a:endParaRPr lang="en-US"/>
           </a:p>
@@ -469,7 +470,7 @@
           <a:p>
             <a:fld id="{FF9B6578-E6E0-4B07-A692-B6456D942F2F}" type="datetimeFigureOut">
               <a:rPr lang="en-US" smtClean="0"/>
-              <a:t>6/8/2020</a:t>
+              <a:t>9/15/2021</a:t>
             </a:fld>
             <a:endParaRPr lang="en-US"/>
           </a:p>
@@ -677,7 +678,7 @@
           <a:p>
             <a:fld id="{FF9B6578-E6E0-4B07-A692-B6456D942F2F}" type="datetimeFigureOut">
               <a:rPr lang="en-US" smtClean="0"/>
-              <a:t>6/8/2020</a:t>
+              <a:t>9/15/2021</a:t>
             </a:fld>
             <a:endParaRPr lang="en-US"/>
           </a:p>
@@ -875,7 +876,7 @@
           <a:p>
             <a:fld id="{FF9B6578-E6E0-4B07-A692-B6456D942F2F}" type="datetimeFigureOut">
               <a:rPr lang="en-US" smtClean="0"/>
-              <a:t>6/8/2020</a:t>
+              <a:t>9/15/2021</a:t>
             </a:fld>
             <a:endParaRPr lang="en-US"/>
           </a:p>
@@ -1150,7 +1151,7 @@
           <a:p>
             <a:fld id="{FF9B6578-E6E0-4B07-A692-B6456D942F2F}" type="datetimeFigureOut">
               <a:rPr lang="en-US" smtClean="0"/>
-              <a:t>6/8/2020</a:t>
+              <a:t>9/15/2021</a:t>
             </a:fld>
             <a:endParaRPr lang="en-US"/>
           </a:p>
@@ -1415,7 +1416,7 @@
           <a:p>
             <a:fld id="{FF9B6578-E6E0-4B07-A692-B6456D942F2F}" type="datetimeFigureOut">
               <a:rPr lang="en-US" smtClean="0"/>
-              <a:t>6/8/2020</a:t>
+              <a:t>9/15/2021</a:t>
             </a:fld>
             <a:endParaRPr lang="en-US"/>
           </a:p>
@@ -1827,7 +1828,7 @@
           <a:p>
             <a:fld id="{FF9B6578-E6E0-4B07-A692-B6456D942F2F}" type="datetimeFigureOut">
               <a:rPr lang="en-US" smtClean="0"/>
-              <a:t>6/8/2020</a:t>
+              <a:t>9/15/2021</a:t>
             </a:fld>
             <a:endParaRPr lang="en-US"/>
           </a:p>
@@ -1968,7 +1969,7 @@
           <a:p>
             <a:fld id="{FF9B6578-E6E0-4B07-A692-B6456D942F2F}" type="datetimeFigureOut">
               <a:rPr lang="en-US" smtClean="0"/>
-              <a:t>6/8/2020</a:t>
+              <a:t>9/15/2021</a:t>
             </a:fld>
             <a:endParaRPr lang="en-US"/>
           </a:p>
@@ -2081,7 +2082,7 @@
           <a:p>
             <a:fld id="{FF9B6578-E6E0-4B07-A692-B6456D942F2F}" type="datetimeFigureOut">
               <a:rPr lang="en-US" smtClean="0"/>
-              <a:t>6/8/2020</a:t>
+              <a:t>9/15/2021</a:t>
             </a:fld>
             <a:endParaRPr lang="en-US"/>
           </a:p>
@@ -2392,7 +2393,7 @@
           <a:p>
             <a:fld id="{FF9B6578-E6E0-4B07-A692-B6456D942F2F}" type="datetimeFigureOut">
               <a:rPr lang="en-US" smtClean="0"/>
-              <a:t>6/8/2020</a:t>
+              <a:t>9/15/2021</a:t>
             </a:fld>
             <a:endParaRPr lang="en-US"/>
           </a:p>
@@ -2680,7 +2681,7 @@
           <a:p>
             <a:fld id="{FF9B6578-E6E0-4B07-A692-B6456D942F2F}" type="datetimeFigureOut">
               <a:rPr lang="en-US" smtClean="0"/>
-              <a:t>6/8/2020</a:t>
+              <a:t>9/15/2021</a:t>
             </a:fld>
             <a:endParaRPr lang="en-US"/>
           </a:p>
@@ -2921,7 +2922,7 @@
           <a:p>
             <a:fld id="{FF9B6578-E6E0-4B07-A692-B6456D942F2F}" type="datetimeFigureOut">
               <a:rPr lang="en-US" smtClean="0"/>
-              <a:t>6/8/2020</a:t>
+              <a:t>9/15/2021</a:t>
             </a:fld>
             <a:endParaRPr lang="en-US"/>
           </a:p>
@@ -9299,45 +9300,2232 @@
 </p:sld>
 </file>
 
+<file path=ppt/slides/slide3.xml><?xml version="1.0" encoding="utf-8"?>
+<p:sld xmlns:a="http://schemas.openxmlformats.org/drawingml/2006/main" xmlns:r="http://schemas.openxmlformats.org/officeDocument/2006/relationships" xmlns:p="http://schemas.openxmlformats.org/presentationml/2006/main">
+  <p:cSld>
+    <p:spTree>
+      <p:nvGrpSpPr>
+        <p:cNvPr id="1" name=""/>
+        <p:cNvGrpSpPr/>
+        <p:nvPr/>
+      </p:nvGrpSpPr>
+      <p:grpSpPr>
+        <a:xfrm>
+          <a:off x="0" y="0"/>
+          <a:ext cx="0" cy="0"/>
+          <a:chOff x="0" y="0"/>
+          <a:chExt cx="0" cy="0"/>
+        </a:xfrm>
+      </p:grpSpPr>
+      <p:grpSp>
+        <p:nvGrpSpPr>
+          <p:cNvPr id="55" name="Group 54">
+            <a:extLst>
+              <a:ext uri="{FF2B5EF4-FFF2-40B4-BE49-F238E27FC236}">
+                <a16:creationId xmlns:a16="http://schemas.microsoft.com/office/drawing/2014/main" id="{7EBBDEBD-BE15-4C5D-98C6-6CF83FBD9D5E}"/>
+              </a:ext>
+            </a:extLst>
+          </p:cNvPr>
+          <p:cNvGrpSpPr/>
+          <p:nvPr/>
+        </p:nvGrpSpPr>
+        <p:grpSpPr>
+          <a:xfrm>
+            <a:off x="897548" y="356946"/>
+            <a:ext cx="2740289" cy="4258596"/>
+            <a:chOff x="897548" y="356946"/>
+            <a:chExt cx="2740289" cy="4258596"/>
+          </a:xfrm>
+        </p:grpSpPr>
+        <p:sp>
+          <p:nvSpPr>
+            <p:cNvPr id="4" name="Rectangle: Rounded Corners 3">
+              <a:extLst>
+                <a:ext uri="{FF2B5EF4-FFF2-40B4-BE49-F238E27FC236}">
+                  <a16:creationId xmlns:a16="http://schemas.microsoft.com/office/drawing/2014/main" id="{26820F50-3638-4299-B83F-4A5D51140FA3}"/>
+                </a:ext>
+              </a:extLst>
+            </p:cNvPr>
+            <p:cNvSpPr/>
+            <p:nvPr/>
+          </p:nvSpPr>
+          <p:spPr>
+            <a:xfrm>
+              <a:off x="897548" y="503139"/>
+              <a:ext cx="2740289" cy="4112403"/>
+            </a:xfrm>
+            <a:prstGeom prst="roundRect">
+              <a:avLst>
+                <a:gd name="adj" fmla="val 3641"/>
+              </a:avLst>
+            </a:prstGeom>
+            <a:noFill/>
+            <a:ln w="25400">
+              <a:solidFill>
+                <a:schemeClr val="tx1">
+                  <a:lumMod val="65000"/>
+                </a:schemeClr>
+              </a:solidFill>
+              <a:miter lim="800000"/>
+            </a:ln>
+          </p:spPr>
+          <p:style>
+            <a:lnRef idx="2">
+              <a:schemeClr val="accent1">
+                <a:shade val="50000"/>
+              </a:schemeClr>
+            </a:lnRef>
+            <a:fillRef idx="1">
+              <a:schemeClr val="accent1"/>
+            </a:fillRef>
+            <a:effectRef idx="0">
+              <a:schemeClr val="accent1"/>
+            </a:effectRef>
+            <a:fontRef idx="minor">
+              <a:schemeClr val="lt1"/>
+            </a:fontRef>
+          </p:style>
+          <p:txBody>
+            <a:bodyPr rtlCol="0" anchor="t" anchorCtr="0"/>
+            <a:lstStyle/>
+            <a:p>
+              <a:pPr algn="ctr"/>
+              <a:endParaRPr lang="en-US">
+                <a:latin typeface="Patron" panose="00000500000000000000" pitchFamily="50" charset="0"/>
+              </a:endParaRPr>
+            </a:p>
+          </p:txBody>
+        </p:sp>
+        <p:sp>
+          <p:nvSpPr>
+            <p:cNvPr id="5" name="TextBox 4">
+              <a:extLst>
+                <a:ext uri="{FF2B5EF4-FFF2-40B4-BE49-F238E27FC236}">
+                  <a16:creationId xmlns:a16="http://schemas.microsoft.com/office/drawing/2014/main" id="{E5248258-19D7-40DC-AEDA-538FAE0EFD00}"/>
+                </a:ext>
+              </a:extLst>
+            </p:cNvPr>
+            <p:cNvSpPr txBox="1"/>
+            <p:nvPr/>
+          </p:nvSpPr>
+          <p:spPr>
+            <a:xfrm>
+              <a:off x="1050628" y="356946"/>
+              <a:ext cx="2255746" cy="284693"/>
+            </a:xfrm>
+            <a:prstGeom prst="rect">
+              <a:avLst/>
+            </a:prstGeom>
+            <a:solidFill>
+              <a:schemeClr val="lt1"/>
+            </a:solidFill>
+          </p:spPr>
+          <p:txBody>
+            <a:bodyPr wrap="none" rtlCol="0">
+              <a:spAutoFit/>
+            </a:bodyPr>
+            <a:lstStyle/>
+            <a:p>
+              <a:r>
+                <a:rPr lang="en-US" sz="1250" dirty="0">
+                  <a:latin typeface="Patron" panose="00000500000000000000" pitchFamily="50" charset="0"/>
+                  <a:ea typeface="Open Sans" panose="020B0606030504020204" pitchFamily="34" charset="0"/>
+                  <a:cs typeface="Open Sans" panose="020B0606030504020204" pitchFamily="34" charset="0"/>
+                </a:rPr>
+                <a:t>Mendix Private Cloud Portal</a:t>
+              </a:r>
+            </a:p>
+          </p:txBody>
+        </p:sp>
+        <p:grpSp>
+          <p:nvGrpSpPr>
+            <p:cNvPr id="50" name="Group 49">
+              <a:extLst>
+                <a:ext uri="{FF2B5EF4-FFF2-40B4-BE49-F238E27FC236}">
+                  <a16:creationId xmlns:a16="http://schemas.microsoft.com/office/drawing/2014/main" id="{96B237E6-65C6-4B1F-9521-3E77804A1161}"/>
+                </a:ext>
+              </a:extLst>
+            </p:cNvPr>
+            <p:cNvGrpSpPr/>
+            <p:nvPr/>
+          </p:nvGrpSpPr>
+          <p:grpSpPr>
+            <a:xfrm>
+              <a:off x="1125232" y="793121"/>
+              <a:ext cx="2272513" cy="3543802"/>
+              <a:chOff x="1125232" y="793121"/>
+              <a:chExt cx="2272513" cy="3543802"/>
+            </a:xfrm>
+          </p:grpSpPr>
+          <p:sp>
+            <p:nvSpPr>
+              <p:cNvPr id="6" name="Rectangle: Rounded Corners 5">
+                <a:extLst>
+                  <a:ext uri="{FF2B5EF4-FFF2-40B4-BE49-F238E27FC236}">
+                    <a16:creationId xmlns:a16="http://schemas.microsoft.com/office/drawing/2014/main" id="{EDB7ED34-FF42-46DA-AEDD-C2A7104E1C01}"/>
+                  </a:ext>
+                </a:extLst>
+              </p:cNvPr>
+              <p:cNvSpPr/>
+              <p:nvPr/>
+            </p:nvSpPr>
+            <p:spPr>
+              <a:xfrm>
+                <a:off x="1125232" y="929448"/>
+                <a:ext cx="2272513" cy="3407475"/>
+              </a:xfrm>
+              <a:prstGeom prst="roundRect">
+                <a:avLst>
+                  <a:gd name="adj" fmla="val 3188"/>
+                </a:avLst>
+              </a:prstGeom>
+              <a:noFill/>
+              <a:ln w="25400">
+                <a:solidFill>
+                  <a:srgbClr val="00B0F0"/>
+                </a:solidFill>
+                <a:prstDash val="sysDot"/>
+              </a:ln>
+            </p:spPr>
+            <p:style>
+              <a:lnRef idx="2">
+                <a:schemeClr val="accent1">
+                  <a:shade val="50000"/>
+                </a:schemeClr>
+              </a:lnRef>
+              <a:fillRef idx="1">
+                <a:schemeClr val="accent1"/>
+              </a:fillRef>
+              <a:effectRef idx="0">
+                <a:schemeClr val="accent1"/>
+              </a:effectRef>
+              <a:fontRef idx="minor">
+                <a:schemeClr val="lt1"/>
+              </a:fontRef>
+            </p:style>
+            <p:txBody>
+              <a:bodyPr rtlCol="0" anchor="ctr"/>
+              <a:lstStyle/>
+              <a:p>
+                <a:pPr algn="ctr"/>
+                <a:endParaRPr lang="en-US">
+                  <a:latin typeface="Patron" panose="00000500000000000000" pitchFamily="50" charset="0"/>
+                </a:endParaRPr>
+              </a:p>
+            </p:txBody>
+          </p:sp>
+          <p:grpSp>
+            <p:nvGrpSpPr>
+              <p:cNvPr id="9" name="Group 8">
+                <a:extLst>
+                  <a:ext uri="{FF2B5EF4-FFF2-40B4-BE49-F238E27FC236}">
+                    <a16:creationId xmlns:a16="http://schemas.microsoft.com/office/drawing/2014/main" id="{6AFBD3CA-5B1E-4710-A5EF-D575BB71758C}"/>
+                  </a:ext>
+                </a:extLst>
+              </p:cNvPr>
+              <p:cNvGrpSpPr/>
+              <p:nvPr/>
+            </p:nvGrpSpPr>
+            <p:grpSpPr>
+              <a:xfrm>
+                <a:off x="1388510" y="1151503"/>
+                <a:ext cx="1662858" cy="582440"/>
+                <a:chOff x="1109050" y="1305209"/>
+                <a:chExt cx="2110966" cy="582440"/>
+              </a:xfrm>
+            </p:grpSpPr>
+            <p:sp>
+              <p:nvSpPr>
+                <p:cNvPr id="7" name="Rectangle: Rounded Corners 6">
+                  <a:extLst>
+                    <a:ext uri="{FF2B5EF4-FFF2-40B4-BE49-F238E27FC236}">
+                      <a16:creationId xmlns:a16="http://schemas.microsoft.com/office/drawing/2014/main" id="{BFCD8381-79BB-447C-B54E-18FD14B4E2FA}"/>
+                    </a:ext>
+                  </a:extLst>
+                </p:cNvPr>
+                <p:cNvSpPr/>
+                <p:nvPr/>
+              </p:nvSpPr>
+              <p:spPr>
+                <a:xfrm>
+                  <a:off x="1182986" y="1377871"/>
+                  <a:ext cx="2012887" cy="475071"/>
+                </a:xfrm>
+                <a:prstGeom prst="roundRect">
+                  <a:avLst>
+                    <a:gd name="adj" fmla="val 7774"/>
+                  </a:avLst>
+                </a:prstGeom>
+                <a:solidFill>
+                  <a:schemeClr val="accent2">
+                    <a:alpha val="71000"/>
+                  </a:schemeClr>
+                </a:solidFill>
+                <a:ln>
+                  <a:noFill/>
+                </a:ln>
+              </p:spPr>
+              <p:style>
+                <a:lnRef idx="2">
+                  <a:schemeClr val="accent1">
+                    <a:shade val="50000"/>
+                  </a:schemeClr>
+                </a:lnRef>
+                <a:fillRef idx="1">
+                  <a:schemeClr val="accent1"/>
+                </a:fillRef>
+                <a:effectRef idx="0">
+                  <a:schemeClr val="accent1"/>
+                </a:effectRef>
+                <a:fontRef idx="minor">
+                  <a:schemeClr val="lt1"/>
+                </a:fontRef>
+              </p:style>
+              <p:txBody>
+                <a:bodyPr rtlCol="0" anchor="ctr"/>
+                <a:lstStyle/>
+                <a:p>
+                  <a:pPr algn="ctr"/>
+                  <a:r>
+                    <a:rPr lang="en-US" sz="1000" dirty="0">
+                      <a:solidFill>
+                        <a:schemeClr val="tx1"/>
+                      </a:solidFill>
+                      <a:latin typeface="Patron" panose="00000500000000000000" pitchFamily="50" charset="0"/>
+                      <a:ea typeface="Open Sans" panose="020B0606030504020204" pitchFamily="34" charset="0"/>
+                      <a:cs typeface="Open Sans" panose="020B0606030504020204" pitchFamily="34" charset="0"/>
+                    </a:rPr>
+                    <a:t>Test</a:t>
+                  </a:r>
+                </a:p>
+              </p:txBody>
+            </p:sp>
+            <p:sp>
+              <p:nvSpPr>
+                <p:cNvPr id="8" name="Rectangle: Rounded Corners 7">
+                  <a:extLst>
+                    <a:ext uri="{FF2B5EF4-FFF2-40B4-BE49-F238E27FC236}">
+                      <a16:creationId xmlns:a16="http://schemas.microsoft.com/office/drawing/2014/main" id="{29E9397D-FD31-45E4-BC5F-9889B9D6A636}"/>
+                    </a:ext>
+                  </a:extLst>
+                </p:cNvPr>
+                <p:cNvSpPr/>
+                <p:nvPr/>
+              </p:nvSpPr>
+              <p:spPr>
+                <a:xfrm>
+                  <a:off x="1109050" y="1305209"/>
+                  <a:ext cx="2110966" cy="582440"/>
+                </a:xfrm>
+                <a:prstGeom prst="roundRect">
+                  <a:avLst>
+                    <a:gd name="adj" fmla="val 11591"/>
+                  </a:avLst>
+                </a:prstGeom>
+                <a:noFill/>
+                <a:ln w="25400">
+                  <a:solidFill>
+                    <a:schemeClr val="tx1"/>
+                  </a:solidFill>
+                </a:ln>
+              </p:spPr>
+              <p:style>
+                <a:lnRef idx="2">
+                  <a:schemeClr val="accent1">
+                    <a:shade val="50000"/>
+                  </a:schemeClr>
+                </a:lnRef>
+                <a:fillRef idx="1">
+                  <a:schemeClr val="accent1"/>
+                </a:fillRef>
+                <a:effectRef idx="0">
+                  <a:schemeClr val="accent1"/>
+                </a:effectRef>
+                <a:fontRef idx="minor">
+                  <a:schemeClr val="lt1"/>
+                </a:fontRef>
+              </p:style>
+              <p:txBody>
+                <a:bodyPr rtlCol="0" anchor="ctr"/>
+                <a:lstStyle/>
+                <a:p>
+                  <a:pPr algn="ctr"/>
+                  <a:endParaRPr lang="en-US">
+                    <a:latin typeface="Patron" panose="00000500000000000000" pitchFamily="50" charset="0"/>
+                  </a:endParaRPr>
+                </a:p>
+              </p:txBody>
+            </p:sp>
+          </p:grpSp>
+          <p:sp>
+            <p:nvSpPr>
+              <p:cNvPr id="10" name="TextBox 9">
+                <a:extLst>
+                  <a:ext uri="{FF2B5EF4-FFF2-40B4-BE49-F238E27FC236}">
+                    <a16:creationId xmlns:a16="http://schemas.microsoft.com/office/drawing/2014/main" id="{55ECF98E-DBCD-4DBD-BDA3-5273FC694DEE}"/>
+                  </a:ext>
+                </a:extLst>
+              </p:cNvPr>
+              <p:cNvSpPr txBox="1"/>
+              <p:nvPr/>
+            </p:nvSpPr>
+            <p:spPr>
+              <a:xfrm>
+                <a:off x="1187660" y="793121"/>
+                <a:ext cx="489236" cy="284693"/>
+              </a:xfrm>
+              <a:prstGeom prst="rect">
+                <a:avLst/>
+              </a:prstGeom>
+              <a:solidFill>
+                <a:schemeClr val="lt1"/>
+              </a:solidFill>
+            </p:spPr>
+            <p:txBody>
+              <a:bodyPr wrap="none" rtlCol="0">
+                <a:spAutoFit/>
+              </a:bodyPr>
+              <a:lstStyle/>
+              <a:p>
+                <a:r>
+                  <a:rPr lang="en-US" sz="1250" dirty="0">
+                    <a:latin typeface="Patron" panose="00000500000000000000" pitchFamily="50" charset="0"/>
+                    <a:ea typeface="Open Sans" panose="020B0606030504020204" pitchFamily="34" charset="0"/>
+                    <a:cs typeface="Open Sans" panose="020B0606030504020204" pitchFamily="34" charset="0"/>
+                  </a:rPr>
+                  <a:t>App</a:t>
+                </a:r>
+              </a:p>
+            </p:txBody>
+          </p:sp>
+          <p:grpSp>
+            <p:nvGrpSpPr>
+              <p:cNvPr id="11" name="Group 10">
+                <a:extLst>
+                  <a:ext uri="{FF2B5EF4-FFF2-40B4-BE49-F238E27FC236}">
+                    <a16:creationId xmlns:a16="http://schemas.microsoft.com/office/drawing/2014/main" id="{4D11FB60-6AF3-457B-A07A-D93C058A1102}"/>
+                  </a:ext>
+                </a:extLst>
+              </p:cNvPr>
+              <p:cNvGrpSpPr/>
+              <p:nvPr/>
+            </p:nvGrpSpPr>
+            <p:grpSpPr>
+              <a:xfrm>
+                <a:off x="1388510" y="3538903"/>
+                <a:ext cx="1662858" cy="582440"/>
+                <a:chOff x="1109050" y="1305209"/>
+                <a:chExt cx="2110966" cy="582440"/>
+              </a:xfrm>
+            </p:grpSpPr>
+            <p:sp>
+              <p:nvSpPr>
+                <p:cNvPr id="12" name="Rectangle: Rounded Corners 11">
+                  <a:extLst>
+                    <a:ext uri="{FF2B5EF4-FFF2-40B4-BE49-F238E27FC236}">
+                      <a16:creationId xmlns:a16="http://schemas.microsoft.com/office/drawing/2014/main" id="{A7877884-75A3-4CD5-A6B7-A5D92BC40E14}"/>
+                    </a:ext>
+                  </a:extLst>
+                </p:cNvPr>
+                <p:cNvSpPr/>
+                <p:nvPr/>
+              </p:nvSpPr>
+              <p:spPr>
+                <a:xfrm>
+                  <a:off x="1182986" y="1377871"/>
+                  <a:ext cx="2012887" cy="475071"/>
+                </a:xfrm>
+                <a:prstGeom prst="roundRect">
+                  <a:avLst>
+                    <a:gd name="adj" fmla="val 7774"/>
+                  </a:avLst>
+                </a:prstGeom>
+                <a:solidFill>
+                  <a:schemeClr val="accent2">
+                    <a:alpha val="71000"/>
+                  </a:schemeClr>
+                </a:solidFill>
+                <a:ln>
+                  <a:noFill/>
+                </a:ln>
+              </p:spPr>
+              <p:style>
+                <a:lnRef idx="2">
+                  <a:schemeClr val="accent1">
+                    <a:shade val="50000"/>
+                  </a:schemeClr>
+                </a:lnRef>
+                <a:fillRef idx="1">
+                  <a:schemeClr val="accent1"/>
+                </a:fillRef>
+                <a:effectRef idx="0">
+                  <a:schemeClr val="accent1"/>
+                </a:effectRef>
+                <a:fontRef idx="minor">
+                  <a:schemeClr val="lt1"/>
+                </a:fontRef>
+              </p:style>
+              <p:txBody>
+                <a:bodyPr rtlCol="0" anchor="ctr"/>
+                <a:lstStyle/>
+                <a:p>
+                  <a:pPr algn="ctr"/>
+                  <a:r>
+                    <a:rPr lang="en-US" sz="1000" dirty="0">
+                      <a:solidFill>
+                        <a:schemeClr val="tx1"/>
+                      </a:solidFill>
+                      <a:latin typeface="Patron" panose="00000500000000000000" pitchFamily="50" charset="0"/>
+                      <a:ea typeface="Open Sans" panose="020B0606030504020204" pitchFamily="34" charset="0"/>
+                      <a:cs typeface="Open Sans" panose="020B0606030504020204" pitchFamily="34" charset="0"/>
+                    </a:rPr>
+                    <a:t>Production</a:t>
+                  </a:r>
+                </a:p>
+              </p:txBody>
+            </p:sp>
+            <p:sp>
+              <p:nvSpPr>
+                <p:cNvPr id="13" name="Rectangle: Rounded Corners 12">
+                  <a:extLst>
+                    <a:ext uri="{FF2B5EF4-FFF2-40B4-BE49-F238E27FC236}">
+                      <a16:creationId xmlns:a16="http://schemas.microsoft.com/office/drawing/2014/main" id="{DCE40CD0-341A-4855-91F3-09A14CC503A2}"/>
+                    </a:ext>
+                  </a:extLst>
+                </p:cNvPr>
+                <p:cNvSpPr/>
+                <p:nvPr/>
+              </p:nvSpPr>
+              <p:spPr>
+                <a:xfrm>
+                  <a:off x="1109050" y="1305209"/>
+                  <a:ext cx="2110966" cy="582440"/>
+                </a:xfrm>
+                <a:prstGeom prst="roundRect">
+                  <a:avLst>
+                    <a:gd name="adj" fmla="val 11591"/>
+                  </a:avLst>
+                </a:prstGeom>
+                <a:noFill/>
+                <a:ln w="25400">
+                  <a:solidFill>
+                    <a:schemeClr val="tx1"/>
+                  </a:solidFill>
+                </a:ln>
+              </p:spPr>
+              <p:style>
+                <a:lnRef idx="2">
+                  <a:schemeClr val="accent1">
+                    <a:shade val="50000"/>
+                  </a:schemeClr>
+                </a:lnRef>
+                <a:fillRef idx="1">
+                  <a:schemeClr val="accent1"/>
+                </a:fillRef>
+                <a:effectRef idx="0">
+                  <a:schemeClr val="accent1"/>
+                </a:effectRef>
+                <a:fontRef idx="minor">
+                  <a:schemeClr val="lt1"/>
+                </a:fontRef>
+              </p:style>
+              <p:txBody>
+                <a:bodyPr rtlCol="0" anchor="ctr"/>
+                <a:lstStyle/>
+                <a:p>
+                  <a:pPr algn="ctr"/>
+                  <a:endParaRPr lang="en-US">
+                    <a:latin typeface="Patron" panose="00000500000000000000" pitchFamily="50" charset="0"/>
+                  </a:endParaRPr>
+                </a:p>
+              </p:txBody>
+            </p:sp>
+          </p:grpSp>
+          <p:grpSp>
+            <p:nvGrpSpPr>
+              <p:cNvPr id="14" name="Group 13">
+                <a:extLst>
+                  <a:ext uri="{FF2B5EF4-FFF2-40B4-BE49-F238E27FC236}">
+                    <a16:creationId xmlns:a16="http://schemas.microsoft.com/office/drawing/2014/main" id="{DC167A36-1A4A-48F8-BD0E-7773BDA1B2D1}"/>
+                  </a:ext>
+                </a:extLst>
+              </p:cNvPr>
+              <p:cNvGrpSpPr/>
+              <p:nvPr/>
+            </p:nvGrpSpPr>
+            <p:grpSpPr>
+              <a:xfrm>
+                <a:off x="1388510" y="2345436"/>
+                <a:ext cx="1662858" cy="582440"/>
+                <a:chOff x="1109050" y="1305209"/>
+                <a:chExt cx="2110966" cy="582440"/>
+              </a:xfrm>
+            </p:grpSpPr>
+            <p:sp>
+              <p:nvSpPr>
+                <p:cNvPr id="15" name="Rectangle: Rounded Corners 14">
+                  <a:extLst>
+                    <a:ext uri="{FF2B5EF4-FFF2-40B4-BE49-F238E27FC236}">
+                      <a16:creationId xmlns:a16="http://schemas.microsoft.com/office/drawing/2014/main" id="{174F8CD0-B8C8-4AD1-82DC-3AC3B9891712}"/>
+                    </a:ext>
+                  </a:extLst>
+                </p:cNvPr>
+                <p:cNvSpPr/>
+                <p:nvPr/>
+              </p:nvSpPr>
+              <p:spPr>
+                <a:xfrm>
+                  <a:off x="1182986" y="1377871"/>
+                  <a:ext cx="2012887" cy="475071"/>
+                </a:xfrm>
+                <a:prstGeom prst="roundRect">
+                  <a:avLst>
+                    <a:gd name="adj" fmla="val 7774"/>
+                  </a:avLst>
+                </a:prstGeom>
+                <a:solidFill>
+                  <a:schemeClr val="accent2">
+                    <a:alpha val="71000"/>
+                  </a:schemeClr>
+                </a:solidFill>
+                <a:ln>
+                  <a:noFill/>
+                </a:ln>
+              </p:spPr>
+              <p:style>
+                <a:lnRef idx="2">
+                  <a:schemeClr val="accent1">
+                    <a:shade val="50000"/>
+                  </a:schemeClr>
+                </a:lnRef>
+                <a:fillRef idx="1">
+                  <a:schemeClr val="accent1"/>
+                </a:fillRef>
+                <a:effectRef idx="0">
+                  <a:schemeClr val="accent1"/>
+                </a:effectRef>
+                <a:fontRef idx="minor">
+                  <a:schemeClr val="lt1"/>
+                </a:fontRef>
+              </p:style>
+              <p:txBody>
+                <a:bodyPr rtlCol="0" anchor="ctr"/>
+                <a:lstStyle/>
+                <a:p>
+                  <a:pPr algn="ctr"/>
+                  <a:r>
+                    <a:rPr lang="en-US" sz="1000" dirty="0">
+                      <a:solidFill>
+                        <a:schemeClr val="tx1"/>
+                      </a:solidFill>
+                      <a:latin typeface="Patron" panose="00000500000000000000" pitchFamily="50" charset="0"/>
+                      <a:ea typeface="Open Sans" panose="020B0606030504020204" pitchFamily="34" charset="0"/>
+                      <a:cs typeface="Open Sans" panose="020B0606030504020204" pitchFamily="34" charset="0"/>
+                    </a:rPr>
+                    <a:t>Acceptance</a:t>
+                  </a:r>
+                </a:p>
+              </p:txBody>
+            </p:sp>
+            <p:sp>
+              <p:nvSpPr>
+                <p:cNvPr id="16" name="Rectangle: Rounded Corners 15">
+                  <a:extLst>
+                    <a:ext uri="{FF2B5EF4-FFF2-40B4-BE49-F238E27FC236}">
+                      <a16:creationId xmlns:a16="http://schemas.microsoft.com/office/drawing/2014/main" id="{540054BE-F6DC-4BE1-B1A1-61B7F869333E}"/>
+                    </a:ext>
+                  </a:extLst>
+                </p:cNvPr>
+                <p:cNvSpPr/>
+                <p:nvPr/>
+              </p:nvSpPr>
+              <p:spPr>
+                <a:xfrm>
+                  <a:off x="1109050" y="1305209"/>
+                  <a:ext cx="2110966" cy="582440"/>
+                </a:xfrm>
+                <a:prstGeom prst="roundRect">
+                  <a:avLst>
+                    <a:gd name="adj" fmla="val 11591"/>
+                  </a:avLst>
+                </a:prstGeom>
+                <a:noFill/>
+                <a:ln w="25400">
+                  <a:solidFill>
+                    <a:schemeClr val="tx1"/>
+                  </a:solidFill>
+                </a:ln>
+              </p:spPr>
+              <p:style>
+                <a:lnRef idx="2">
+                  <a:schemeClr val="accent1">
+                    <a:shade val="50000"/>
+                  </a:schemeClr>
+                </a:lnRef>
+                <a:fillRef idx="1">
+                  <a:schemeClr val="accent1"/>
+                </a:fillRef>
+                <a:effectRef idx="0">
+                  <a:schemeClr val="accent1"/>
+                </a:effectRef>
+                <a:fontRef idx="minor">
+                  <a:schemeClr val="lt1"/>
+                </a:fontRef>
+              </p:style>
+              <p:txBody>
+                <a:bodyPr rtlCol="0" anchor="ctr"/>
+                <a:lstStyle/>
+                <a:p>
+                  <a:pPr algn="ctr"/>
+                  <a:endParaRPr lang="en-US">
+                    <a:latin typeface="Patron" panose="00000500000000000000" pitchFamily="50" charset="0"/>
+                  </a:endParaRPr>
+                </a:p>
+              </p:txBody>
+            </p:sp>
+          </p:grpSp>
+        </p:grpSp>
+      </p:grpSp>
+      <p:grpSp>
+        <p:nvGrpSpPr>
+          <p:cNvPr id="53" name="Group 52">
+            <a:extLst>
+              <a:ext uri="{FF2B5EF4-FFF2-40B4-BE49-F238E27FC236}">
+                <a16:creationId xmlns:a16="http://schemas.microsoft.com/office/drawing/2014/main" id="{628EDAA5-BFD1-420B-B18B-4908632E8CE8}"/>
+              </a:ext>
+            </a:extLst>
+          </p:cNvPr>
+          <p:cNvGrpSpPr/>
+          <p:nvPr/>
+        </p:nvGrpSpPr>
+        <p:grpSpPr>
+          <a:xfrm>
+            <a:off x="4410269" y="356946"/>
+            <a:ext cx="6796451" cy="4258597"/>
+            <a:chOff x="4410269" y="356946"/>
+            <a:chExt cx="6796451" cy="4258597"/>
+          </a:xfrm>
+        </p:grpSpPr>
+        <p:sp>
+          <p:nvSpPr>
+            <p:cNvPr id="28" name="Rectangle: Rounded Corners 27">
+              <a:extLst>
+                <a:ext uri="{FF2B5EF4-FFF2-40B4-BE49-F238E27FC236}">
+                  <a16:creationId xmlns:a16="http://schemas.microsoft.com/office/drawing/2014/main" id="{E1938BE6-8033-4379-B349-585B461AC81B}"/>
+                </a:ext>
+              </a:extLst>
+            </p:cNvPr>
+            <p:cNvSpPr/>
+            <p:nvPr/>
+          </p:nvSpPr>
+          <p:spPr>
+            <a:xfrm>
+              <a:off x="4410269" y="503140"/>
+              <a:ext cx="6796451" cy="4112403"/>
+            </a:xfrm>
+            <a:prstGeom prst="roundRect">
+              <a:avLst>
+                <a:gd name="adj" fmla="val 3641"/>
+              </a:avLst>
+            </a:prstGeom>
+            <a:noFill/>
+            <a:ln w="25400">
+              <a:solidFill>
+                <a:schemeClr val="tx1">
+                  <a:lumMod val="65000"/>
+                </a:schemeClr>
+              </a:solidFill>
+              <a:miter lim="800000"/>
+            </a:ln>
+          </p:spPr>
+          <p:style>
+            <a:lnRef idx="2">
+              <a:schemeClr val="accent1">
+                <a:shade val="50000"/>
+              </a:schemeClr>
+            </a:lnRef>
+            <a:fillRef idx="1">
+              <a:schemeClr val="accent1"/>
+            </a:fillRef>
+            <a:effectRef idx="0">
+              <a:schemeClr val="accent1"/>
+            </a:effectRef>
+            <a:fontRef idx="minor">
+              <a:schemeClr val="lt1"/>
+            </a:fontRef>
+          </p:style>
+          <p:txBody>
+            <a:bodyPr rtlCol="0" anchor="t" anchorCtr="0"/>
+            <a:lstStyle/>
+            <a:p>
+              <a:pPr algn="ctr"/>
+              <a:endParaRPr lang="en-US">
+                <a:latin typeface="Patron" panose="00000500000000000000" pitchFamily="50" charset="0"/>
+              </a:endParaRPr>
+            </a:p>
+          </p:txBody>
+        </p:sp>
+        <p:sp>
+          <p:nvSpPr>
+            <p:cNvPr id="29" name="TextBox 28">
+              <a:extLst>
+                <a:ext uri="{FF2B5EF4-FFF2-40B4-BE49-F238E27FC236}">
+                  <a16:creationId xmlns:a16="http://schemas.microsoft.com/office/drawing/2014/main" id="{58989516-090D-4A86-9541-0B3148E43624}"/>
+                </a:ext>
+              </a:extLst>
+            </p:cNvPr>
+            <p:cNvSpPr txBox="1"/>
+            <p:nvPr/>
+          </p:nvSpPr>
+          <p:spPr>
+            <a:xfrm>
+              <a:off x="4584612" y="356946"/>
+              <a:ext cx="1654620" cy="284693"/>
+            </a:xfrm>
+            <a:prstGeom prst="rect">
+              <a:avLst/>
+            </a:prstGeom>
+            <a:solidFill>
+              <a:schemeClr val="lt1"/>
+            </a:solidFill>
+          </p:spPr>
+          <p:txBody>
+            <a:bodyPr wrap="none" rtlCol="0">
+              <a:spAutoFit/>
+            </a:bodyPr>
+            <a:lstStyle/>
+            <a:p>
+              <a:r>
+                <a:rPr lang="en-US" sz="1250" dirty="0">
+                  <a:latin typeface="Patron" panose="00000500000000000000" pitchFamily="50" charset="0"/>
+                  <a:ea typeface="Open Sans" panose="020B0606030504020204" pitchFamily="34" charset="0"/>
+                  <a:cs typeface="Open Sans" panose="020B0606030504020204" pitchFamily="34" charset="0"/>
+                </a:rPr>
+                <a:t>Kubernetes Cluster</a:t>
+              </a:r>
+            </a:p>
+          </p:txBody>
+        </p:sp>
+        <p:grpSp>
+          <p:nvGrpSpPr>
+            <p:cNvPr id="51" name="Group 50">
+              <a:extLst>
+                <a:ext uri="{FF2B5EF4-FFF2-40B4-BE49-F238E27FC236}">
+                  <a16:creationId xmlns:a16="http://schemas.microsoft.com/office/drawing/2014/main" id="{D70AB029-ABFC-415E-B5F8-97DFEC8295C9}"/>
+                </a:ext>
+              </a:extLst>
+            </p:cNvPr>
+            <p:cNvGrpSpPr/>
+            <p:nvPr/>
+          </p:nvGrpSpPr>
+          <p:grpSpPr>
+            <a:xfrm>
+              <a:off x="4702629" y="929448"/>
+              <a:ext cx="6244481" cy="1670683"/>
+              <a:chOff x="4702629" y="929448"/>
+              <a:chExt cx="6244481" cy="1670683"/>
+            </a:xfrm>
+          </p:grpSpPr>
+          <p:sp>
+            <p:nvSpPr>
+              <p:cNvPr id="30" name="Rectangle: Rounded Corners 29">
+                <a:extLst>
+                  <a:ext uri="{FF2B5EF4-FFF2-40B4-BE49-F238E27FC236}">
+                    <a16:creationId xmlns:a16="http://schemas.microsoft.com/office/drawing/2014/main" id="{3DF7A5AB-1125-425E-A8E4-943290F736D1}"/>
+                  </a:ext>
+                </a:extLst>
+              </p:cNvPr>
+              <p:cNvSpPr/>
+              <p:nvPr/>
+            </p:nvSpPr>
+            <p:spPr>
+              <a:xfrm>
+                <a:off x="4702629" y="929448"/>
+                <a:ext cx="6244481" cy="1670683"/>
+              </a:xfrm>
+              <a:prstGeom prst="roundRect">
+                <a:avLst>
+                  <a:gd name="adj" fmla="val 3188"/>
+                </a:avLst>
+              </a:prstGeom>
+              <a:noFill/>
+              <a:ln w="25400">
+                <a:solidFill>
+                  <a:srgbClr val="00B0F0"/>
+                </a:solidFill>
+                <a:prstDash val="sysDot"/>
+              </a:ln>
+            </p:spPr>
+            <p:style>
+              <a:lnRef idx="2">
+                <a:schemeClr val="accent1">
+                  <a:shade val="50000"/>
+                </a:schemeClr>
+              </a:lnRef>
+              <a:fillRef idx="1">
+                <a:schemeClr val="accent1"/>
+              </a:fillRef>
+              <a:effectRef idx="0">
+                <a:schemeClr val="accent1"/>
+              </a:effectRef>
+              <a:fontRef idx="minor">
+                <a:schemeClr val="lt1"/>
+              </a:fontRef>
+            </p:style>
+            <p:txBody>
+              <a:bodyPr rtlCol="0" anchor="ctr"/>
+              <a:lstStyle/>
+              <a:p>
+                <a:pPr algn="ctr"/>
+                <a:endParaRPr lang="en-US">
+                  <a:latin typeface="Patron" panose="00000500000000000000" pitchFamily="50" charset="0"/>
+                </a:endParaRPr>
+              </a:p>
+            </p:txBody>
+          </p:sp>
+          <p:grpSp>
+            <p:nvGrpSpPr>
+              <p:cNvPr id="31" name="Group 30">
+                <a:extLst>
+                  <a:ext uri="{FF2B5EF4-FFF2-40B4-BE49-F238E27FC236}">
+                    <a16:creationId xmlns:a16="http://schemas.microsoft.com/office/drawing/2014/main" id="{79AD35CF-C8CE-433E-84FA-3C256F8EA943}"/>
+                  </a:ext>
+                </a:extLst>
+              </p:cNvPr>
+              <p:cNvGrpSpPr/>
+              <p:nvPr/>
+            </p:nvGrpSpPr>
+            <p:grpSpPr>
+              <a:xfrm>
+                <a:off x="9041363" y="1152779"/>
+                <a:ext cx="1662858" cy="581164"/>
+                <a:chOff x="1109050" y="1302512"/>
+                <a:chExt cx="2110966" cy="582440"/>
+              </a:xfrm>
+            </p:grpSpPr>
+            <p:sp>
+              <p:nvSpPr>
+                <p:cNvPr id="32" name="Rectangle: Rounded Corners 31">
+                  <a:extLst>
+                    <a:ext uri="{FF2B5EF4-FFF2-40B4-BE49-F238E27FC236}">
+                      <a16:creationId xmlns:a16="http://schemas.microsoft.com/office/drawing/2014/main" id="{A2E5BF29-3D2E-4ECC-8331-DF21572CF0D5}"/>
+                    </a:ext>
+                  </a:extLst>
+                </p:cNvPr>
+                <p:cNvSpPr/>
+                <p:nvPr/>
+              </p:nvSpPr>
+              <p:spPr>
+                <a:xfrm>
+                  <a:off x="1182986" y="1375174"/>
+                  <a:ext cx="2012887" cy="475071"/>
+                </a:xfrm>
+                <a:prstGeom prst="roundRect">
+                  <a:avLst>
+                    <a:gd name="adj" fmla="val 7774"/>
+                  </a:avLst>
+                </a:prstGeom>
+                <a:solidFill>
+                  <a:schemeClr val="accent3">
+                    <a:alpha val="71000"/>
+                  </a:schemeClr>
+                </a:solidFill>
+                <a:ln>
+                  <a:noFill/>
+                </a:ln>
+              </p:spPr>
+              <p:style>
+                <a:lnRef idx="2">
+                  <a:schemeClr val="accent1">
+                    <a:shade val="50000"/>
+                  </a:schemeClr>
+                </a:lnRef>
+                <a:fillRef idx="1">
+                  <a:schemeClr val="accent1"/>
+                </a:fillRef>
+                <a:effectRef idx="0">
+                  <a:schemeClr val="accent1"/>
+                </a:effectRef>
+                <a:fontRef idx="minor">
+                  <a:schemeClr val="lt1"/>
+                </a:fontRef>
+              </p:style>
+              <p:txBody>
+                <a:bodyPr rtlCol="0" anchor="ctr"/>
+                <a:lstStyle/>
+                <a:p>
+                  <a:pPr algn="ctr"/>
+                  <a:r>
+                    <a:rPr lang="en-US" sz="1000" dirty="0">
+                      <a:solidFill>
+                        <a:schemeClr val="tx1"/>
+                      </a:solidFill>
+                      <a:latin typeface="Patron" panose="00000500000000000000" pitchFamily="50" charset="0"/>
+                      <a:ea typeface="Open Sans" panose="020B0606030504020204" pitchFamily="34" charset="0"/>
+                      <a:cs typeface="Open Sans" panose="020B0606030504020204" pitchFamily="34" charset="0"/>
+                    </a:rPr>
+                    <a:t>Test</a:t>
+                  </a:r>
+                </a:p>
+              </p:txBody>
+            </p:sp>
+            <p:sp>
+              <p:nvSpPr>
+                <p:cNvPr id="33" name="Rectangle: Rounded Corners 32">
+                  <a:extLst>
+                    <a:ext uri="{FF2B5EF4-FFF2-40B4-BE49-F238E27FC236}">
+                      <a16:creationId xmlns:a16="http://schemas.microsoft.com/office/drawing/2014/main" id="{7F592FE3-364B-4764-8BBA-45E6EA713C52}"/>
+                    </a:ext>
+                  </a:extLst>
+                </p:cNvPr>
+                <p:cNvSpPr/>
+                <p:nvPr/>
+              </p:nvSpPr>
+              <p:spPr>
+                <a:xfrm>
+                  <a:off x="1109050" y="1302512"/>
+                  <a:ext cx="2110966" cy="582440"/>
+                </a:xfrm>
+                <a:prstGeom prst="roundRect">
+                  <a:avLst>
+                    <a:gd name="adj" fmla="val 11591"/>
+                  </a:avLst>
+                </a:prstGeom>
+                <a:noFill/>
+                <a:ln w="25400">
+                  <a:solidFill>
+                    <a:schemeClr val="tx1"/>
+                  </a:solidFill>
+                </a:ln>
+              </p:spPr>
+              <p:style>
+                <a:lnRef idx="2">
+                  <a:schemeClr val="accent1">
+                    <a:shade val="50000"/>
+                  </a:schemeClr>
+                </a:lnRef>
+                <a:fillRef idx="1">
+                  <a:schemeClr val="accent1"/>
+                </a:fillRef>
+                <a:effectRef idx="0">
+                  <a:schemeClr val="accent1"/>
+                </a:effectRef>
+                <a:fontRef idx="minor">
+                  <a:schemeClr val="lt1"/>
+                </a:fontRef>
+              </p:style>
+              <p:txBody>
+                <a:bodyPr rtlCol="0" anchor="ctr"/>
+                <a:lstStyle/>
+                <a:p>
+                  <a:pPr algn="ctr"/>
+                  <a:endParaRPr lang="en-US">
+                    <a:latin typeface="Patron" panose="00000500000000000000" pitchFamily="50" charset="0"/>
+                  </a:endParaRPr>
+                </a:p>
+              </p:txBody>
+            </p:sp>
+          </p:grpSp>
+          <p:sp>
+            <p:nvSpPr>
+              <p:cNvPr id="34" name="TextBox 33">
+                <a:extLst>
+                  <a:ext uri="{FF2B5EF4-FFF2-40B4-BE49-F238E27FC236}">
+                    <a16:creationId xmlns:a16="http://schemas.microsoft.com/office/drawing/2014/main" id="{1A01B0A0-AF29-4266-A3AE-577045B026FE}"/>
+                  </a:ext>
+                </a:extLst>
+              </p:cNvPr>
+              <p:cNvSpPr txBox="1"/>
+              <p:nvPr/>
+            </p:nvSpPr>
+            <p:spPr>
+              <a:xfrm>
+                <a:off x="4813040" y="1006459"/>
+                <a:ext cx="1197764" cy="284693"/>
+              </a:xfrm>
+              <a:prstGeom prst="rect">
+                <a:avLst/>
+              </a:prstGeom>
+              <a:solidFill>
+                <a:schemeClr val="lt1"/>
+              </a:solidFill>
+            </p:spPr>
+            <p:txBody>
+              <a:bodyPr wrap="none" rtlCol="0">
+                <a:spAutoFit/>
+              </a:bodyPr>
+              <a:lstStyle/>
+              <a:p>
+                <a:r>
+                  <a:rPr lang="en-US" sz="1250" dirty="0">
+                    <a:latin typeface="Patron" panose="00000500000000000000" pitchFamily="50" charset="0"/>
+                    <a:ea typeface="Open Sans" panose="020B0606030504020204" pitchFamily="34" charset="0"/>
+                    <a:cs typeface="Open Sans" panose="020B0606030504020204" pitchFamily="34" charset="0"/>
+                  </a:rPr>
+                  <a:t>Namespace 1</a:t>
+                </a:r>
+              </a:p>
+            </p:txBody>
+          </p:sp>
+          <p:grpSp>
+            <p:nvGrpSpPr>
+              <p:cNvPr id="38" name="Group 37">
+                <a:extLst>
+                  <a:ext uri="{FF2B5EF4-FFF2-40B4-BE49-F238E27FC236}">
+                    <a16:creationId xmlns:a16="http://schemas.microsoft.com/office/drawing/2014/main" id="{1C94EB3A-5B4B-4B2F-91DE-5C8FE4A6E747}"/>
+                  </a:ext>
+                </a:extLst>
+              </p:cNvPr>
+              <p:cNvGrpSpPr/>
+              <p:nvPr/>
+            </p:nvGrpSpPr>
+            <p:grpSpPr>
+              <a:xfrm>
+                <a:off x="9041363" y="1912693"/>
+                <a:ext cx="1662858" cy="581163"/>
+                <a:chOff x="1109050" y="1302512"/>
+                <a:chExt cx="2110966" cy="582440"/>
+              </a:xfrm>
+            </p:grpSpPr>
+            <p:sp>
+              <p:nvSpPr>
+                <p:cNvPr id="39" name="Rectangle: Rounded Corners 38">
+                  <a:extLst>
+                    <a:ext uri="{FF2B5EF4-FFF2-40B4-BE49-F238E27FC236}">
+                      <a16:creationId xmlns:a16="http://schemas.microsoft.com/office/drawing/2014/main" id="{822AC595-8719-4A17-90E9-EED6AF50047E}"/>
+                    </a:ext>
+                  </a:extLst>
+                </p:cNvPr>
+                <p:cNvSpPr/>
+                <p:nvPr/>
+              </p:nvSpPr>
+              <p:spPr>
+                <a:xfrm>
+                  <a:off x="1182986" y="1375174"/>
+                  <a:ext cx="2012887" cy="475071"/>
+                </a:xfrm>
+                <a:prstGeom prst="roundRect">
+                  <a:avLst>
+                    <a:gd name="adj" fmla="val 7774"/>
+                  </a:avLst>
+                </a:prstGeom>
+                <a:solidFill>
+                  <a:schemeClr val="accent3">
+                    <a:alpha val="71000"/>
+                  </a:schemeClr>
+                </a:solidFill>
+                <a:ln>
+                  <a:noFill/>
+                </a:ln>
+              </p:spPr>
+              <p:style>
+                <a:lnRef idx="2">
+                  <a:schemeClr val="accent1">
+                    <a:shade val="50000"/>
+                  </a:schemeClr>
+                </a:lnRef>
+                <a:fillRef idx="1">
+                  <a:schemeClr val="accent1"/>
+                </a:fillRef>
+                <a:effectRef idx="0">
+                  <a:schemeClr val="accent1"/>
+                </a:effectRef>
+                <a:fontRef idx="minor">
+                  <a:schemeClr val="lt1"/>
+                </a:fontRef>
+              </p:style>
+              <p:txBody>
+                <a:bodyPr rtlCol="0" anchor="ctr"/>
+                <a:lstStyle/>
+                <a:p>
+                  <a:pPr algn="ctr"/>
+                  <a:r>
+                    <a:rPr lang="en-US" sz="1000" dirty="0">
+                      <a:solidFill>
+                        <a:schemeClr val="tx1"/>
+                      </a:solidFill>
+                      <a:latin typeface="Patron" panose="00000500000000000000" pitchFamily="50" charset="0"/>
+                      <a:ea typeface="Open Sans" panose="020B0606030504020204" pitchFamily="34" charset="0"/>
+                      <a:cs typeface="Open Sans" panose="020B0606030504020204" pitchFamily="34" charset="0"/>
+                    </a:rPr>
+                    <a:t>Acceptance</a:t>
+                  </a:r>
+                </a:p>
+              </p:txBody>
+            </p:sp>
+            <p:sp>
+              <p:nvSpPr>
+                <p:cNvPr id="40" name="Rectangle: Rounded Corners 39">
+                  <a:extLst>
+                    <a:ext uri="{FF2B5EF4-FFF2-40B4-BE49-F238E27FC236}">
+                      <a16:creationId xmlns:a16="http://schemas.microsoft.com/office/drawing/2014/main" id="{0B7B3531-2ADE-402C-932A-AEDE14392994}"/>
+                    </a:ext>
+                  </a:extLst>
+                </p:cNvPr>
+                <p:cNvSpPr/>
+                <p:nvPr/>
+              </p:nvSpPr>
+              <p:spPr>
+                <a:xfrm>
+                  <a:off x="1109050" y="1302512"/>
+                  <a:ext cx="2110966" cy="582440"/>
+                </a:xfrm>
+                <a:prstGeom prst="roundRect">
+                  <a:avLst>
+                    <a:gd name="adj" fmla="val 11591"/>
+                  </a:avLst>
+                </a:prstGeom>
+                <a:noFill/>
+                <a:ln w="25400">
+                  <a:solidFill>
+                    <a:schemeClr val="tx1"/>
+                  </a:solidFill>
+                </a:ln>
+              </p:spPr>
+              <p:style>
+                <a:lnRef idx="2">
+                  <a:schemeClr val="accent1">
+                    <a:shade val="50000"/>
+                  </a:schemeClr>
+                </a:lnRef>
+                <a:fillRef idx="1">
+                  <a:schemeClr val="accent1"/>
+                </a:fillRef>
+                <a:effectRef idx="0">
+                  <a:schemeClr val="accent1"/>
+                </a:effectRef>
+                <a:fontRef idx="minor">
+                  <a:schemeClr val="lt1"/>
+                </a:fontRef>
+              </p:style>
+              <p:txBody>
+                <a:bodyPr rtlCol="0" anchor="ctr"/>
+                <a:lstStyle/>
+                <a:p>
+                  <a:pPr algn="ctr"/>
+                  <a:endParaRPr lang="en-US">
+                    <a:latin typeface="Patron" panose="00000500000000000000" pitchFamily="50" charset="0"/>
+                  </a:endParaRPr>
+                </a:p>
+              </p:txBody>
+            </p:sp>
+          </p:grpSp>
+          <p:grpSp>
+            <p:nvGrpSpPr>
+              <p:cNvPr id="70" name="Group 69">
+                <a:extLst>
+                  <a:ext uri="{FF2B5EF4-FFF2-40B4-BE49-F238E27FC236}">
+                    <a16:creationId xmlns:a16="http://schemas.microsoft.com/office/drawing/2014/main" id="{BE6F108A-C7AD-4D3B-B6F6-A7C32BA6C19B}"/>
+                  </a:ext>
+                </a:extLst>
+              </p:cNvPr>
+              <p:cNvGrpSpPr/>
+              <p:nvPr/>
+            </p:nvGrpSpPr>
+            <p:grpSpPr>
+              <a:xfrm>
+                <a:off x="6977065" y="1541554"/>
+                <a:ext cx="1662858" cy="581164"/>
+                <a:chOff x="1109050" y="1302512"/>
+                <a:chExt cx="2110966" cy="582440"/>
+              </a:xfrm>
+            </p:grpSpPr>
+            <p:sp>
+              <p:nvSpPr>
+                <p:cNvPr id="71" name="Rectangle: Rounded Corners 70">
+                  <a:extLst>
+                    <a:ext uri="{FF2B5EF4-FFF2-40B4-BE49-F238E27FC236}">
+                      <a16:creationId xmlns:a16="http://schemas.microsoft.com/office/drawing/2014/main" id="{E4F041AA-98C1-4838-AAD4-C3832ACF521D}"/>
+                    </a:ext>
+                  </a:extLst>
+                </p:cNvPr>
+                <p:cNvSpPr/>
+                <p:nvPr/>
+              </p:nvSpPr>
+              <p:spPr>
+                <a:xfrm>
+                  <a:off x="1182986" y="1375174"/>
+                  <a:ext cx="2012887" cy="475071"/>
+                </a:xfrm>
+                <a:prstGeom prst="roundRect">
+                  <a:avLst>
+                    <a:gd name="adj" fmla="val 7774"/>
+                  </a:avLst>
+                </a:prstGeom>
+                <a:solidFill>
+                  <a:schemeClr val="accent6">
+                    <a:alpha val="71000"/>
+                  </a:schemeClr>
+                </a:solidFill>
+                <a:ln>
+                  <a:noFill/>
+                </a:ln>
+              </p:spPr>
+              <p:style>
+                <a:lnRef idx="2">
+                  <a:schemeClr val="accent1">
+                    <a:shade val="50000"/>
+                  </a:schemeClr>
+                </a:lnRef>
+                <a:fillRef idx="1">
+                  <a:schemeClr val="accent1"/>
+                </a:fillRef>
+                <a:effectRef idx="0">
+                  <a:schemeClr val="accent1"/>
+                </a:effectRef>
+                <a:fontRef idx="minor">
+                  <a:schemeClr val="lt1"/>
+                </a:fontRef>
+              </p:style>
+              <p:txBody>
+                <a:bodyPr rtlCol="0" anchor="ctr"/>
+                <a:lstStyle/>
+                <a:p>
+                  <a:pPr algn="ctr"/>
+                  <a:r>
+                    <a:rPr lang="en-US" sz="1000" dirty="0">
+                      <a:solidFill>
+                        <a:schemeClr val="tx1"/>
+                      </a:solidFill>
+                      <a:latin typeface="Patron" panose="00000500000000000000" pitchFamily="50" charset="0"/>
+                      <a:ea typeface="Open Sans" panose="020B0606030504020204" pitchFamily="34" charset="0"/>
+                      <a:cs typeface="Open Sans" panose="020B0606030504020204" pitchFamily="34" charset="0"/>
+                    </a:rPr>
+                    <a:t>Operator</a:t>
+                  </a:r>
+                </a:p>
+              </p:txBody>
+            </p:sp>
+            <p:sp>
+              <p:nvSpPr>
+                <p:cNvPr id="72" name="Rectangle: Rounded Corners 71">
+                  <a:extLst>
+                    <a:ext uri="{FF2B5EF4-FFF2-40B4-BE49-F238E27FC236}">
+                      <a16:creationId xmlns:a16="http://schemas.microsoft.com/office/drawing/2014/main" id="{3789980B-39D4-44FA-8C1C-CD0C6D8B7C02}"/>
+                    </a:ext>
+                  </a:extLst>
+                </p:cNvPr>
+                <p:cNvSpPr/>
+                <p:nvPr/>
+              </p:nvSpPr>
+              <p:spPr>
+                <a:xfrm>
+                  <a:off x="1109050" y="1302512"/>
+                  <a:ext cx="2110966" cy="582440"/>
+                </a:xfrm>
+                <a:prstGeom prst="roundRect">
+                  <a:avLst>
+                    <a:gd name="adj" fmla="val 11591"/>
+                  </a:avLst>
+                </a:prstGeom>
+                <a:noFill/>
+                <a:ln w="25400">
+                  <a:solidFill>
+                    <a:schemeClr val="tx1"/>
+                  </a:solidFill>
+                </a:ln>
+              </p:spPr>
+              <p:style>
+                <a:lnRef idx="2">
+                  <a:schemeClr val="accent1">
+                    <a:shade val="50000"/>
+                  </a:schemeClr>
+                </a:lnRef>
+                <a:fillRef idx="1">
+                  <a:schemeClr val="accent1"/>
+                </a:fillRef>
+                <a:effectRef idx="0">
+                  <a:schemeClr val="accent1"/>
+                </a:effectRef>
+                <a:fontRef idx="minor">
+                  <a:schemeClr val="lt1"/>
+                </a:fontRef>
+              </p:style>
+              <p:txBody>
+                <a:bodyPr rtlCol="0" anchor="ctr"/>
+                <a:lstStyle/>
+                <a:p>
+                  <a:pPr algn="ctr"/>
+                  <a:endParaRPr lang="en-US">
+                    <a:latin typeface="Patron" panose="00000500000000000000" pitchFamily="50" charset="0"/>
+                  </a:endParaRPr>
+                </a:p>
+              </p:txBody>
+            </p:sp>
+          </p:grpSp>
+          <p:grpSp>
+            <p:nvGrpSpPr>
+              <p:cNvPr id="76" name="Group 75">
+                <a:extLst>
+                  <a:ext uri="{FF2B5EF4-FFF2-40B4-BE49-F238E27FC236}">
+                    <a16:creationId xmlns:a16="http://schemas.microsoft.com/office/drawing/2014/main" id="{F7D44E3D-13D0-4D90-B8A2-7BDB4491C539}"/>
+                  </a:ext>
+                </a:extLst>
+              </p:cNvPr>
+              <p:cNvGrpSpPr/>
+              <p:nvPr/>
+            </p:nvGrpSpPr>
+            <p:grpSpPr>
+              <a:xfrm>
+                <a:off x="4906447" y="1537094"/>
+                <a:ext cx="1662858" cy="581164"/>
+                <a:chOff x="1109050" y="1302512"/>
+                <a:chExt cx="2110966" cy="582440"/>
+              </a:xfrm>
+            </p:grpSpPr>
+            <p:sp>
+              <p:nvSpPr>
+                <p:cNvPr id="77" name="Rectangle: Rounded Corners 76">
+                  <a:extLst>
+                    <a:ext uri="{FF2B5EF4-FFF2-40B4-BE49-F238E27FC236}">
+                      <a16:creationId xmlns:a16="http://schemas.microsoft.com/office/drawing/2014/main" id="{A8F9450E-A5EF-4034-9263-57217DD5EC2B}"/>
+                    </a:ext>
+                  </a:extLst>
+                </p:cNvPr>
+                <p:cNvSpPr/>
+                <p:nvPr/>
+              </p:nvSpPr>
+              <p:spPr>
+                <a:xfrm>
+                  <a:off x="1182986" y="1375174"/>
+                  <a:ext cx="2012887" cy="475071"/>
+                </a:xfrm>
+                <a:prstGeom prst="roundRect">
+                  <a:avLst>
+                    <a:gd name="adj" fmla="val 7774"/>
+                  </a:avLst>
+                </a:prstGeom>
+                <a:solidFill>
+                  <a:schemeClr val="accent1">
+                    <a:alpha val="71000"/>
+                  </a:schemeClr>
+                </a:solidFill>
+                <a:ln>
+                  <a:noFill/>
+                </a:ln>
+              </p:spPr>
+              <p:style>
+                <a:lnRef idx="2">
+                  <a:schemeClr val="accent1">
+                    <a:shade val="50000"/>
+                  </a:schemeClr>
+                </a:lnRef>
+                <a:fillRef idx="1">
+                  <a:schemeClr val="accent1"/>
+                </a:fillRef>
+                <a:effectRef idx="0">
+                  <a:schemeClr val="accent1"/>
+                </a:effectRef>
+                <a:fontRef idx="minor">
+                  <a:schemeClr val="lt1"/>
+                </a:fontRef>
+              </p:style>
+              <p:txBody>
+                <a:bodyPr rtlCol="0" anchor="ctr"/>
+                <a:lstStyle/>
+                <a:p>
+                  <a:pPr algn="ctr"/>
+                  <a:r>
+                    <a:rPr lang="en-US" sz="1000" dirty="0">
+                      <a:solidFill>
+                        <a:schemeClr val="tx1"/>
+                      </a:solidFill>
+                      <a:latin typeface="Patron" panose="00000500000000000000" pitchFamily="50" charset="0"/>
+                      <a:ea typeface="Open Sans" panose="020B0606030504020204" pitchFamily="34" charset="0"/>
+                      <a:cs typeface="Open Sans" panose="020B0606030504020204" pitchFamily="34" charset="0"/>
+                    </a:rPr>
+                    <a:t>Gateway</a:t>
+                  </a:r>
+                </a:p>
+              </p:txBody>
+            </p:sp>
+            <p:sp>
+              <p:nvSpPr>
+                <p:cNvPr id="78" name="Rectangle: Rounded Corners 77">
+                  <a:extLst>
+                    <a:ext uri="{FF2B5EF4-FFF2-40B4-BE49-F238E27FC236}">
+                      <a16:creationId xmlns:a16="http://schemas.microsoft.com/office/drawing/2014/main" id="{7056047E-34EB-4E64-A6D8-37247488DD54}"/>
+                    </a:ext>
+                  </a:extLst>
+                </p:cNvPr>
+                <p:cNvSpPr/>
+                <p:nvPr/>
+              </p:nvSpPr>
+              <p:spPr>
+                <a:xfrm>
+                  <a:off x="1109050" y="1302512"/>
+                  <a:ext cx="2110966" cy="582440"/>
+                </a:xfrm>
+                <a:prstGeom prst="roundRect">
+                  <a:avLst>
+                    <a:gd name="adj" fmla="val 11591"/>
+                  </a:avLst>
+                </a:prstGeom>
+                <a:noFill/>
+                <a:ln w="25400">
+                  <a:solidFill>
+                    <a:schemeClr val="tx1"/>
+                  </a:solidFill>
+                </a:ln>
+              </p:spPr>
+              <p:style>
+                <a:lnRef idx="2">
+                  <a:schemeClr val="accent1">
+                    <a:shade val="50000"/>
+                  </a:schemeClr>
+                </a:lnRef>
+                <a:fillRef idx="1">
+                  <a:schemeClr val="accent1"/>
+                </a:fillRef>
+                <a:effectRef idx="0">
+                  <a:schemeClr val="accent1"/>
+                </a:effectRef>
+                <a:fontRef idx="minor">
+                  <a:schemeClr val="lt1"/>
+                </a:fontRef>
+              </p:style>
+              <p:txBody>
+                <a:bodyPr rtlCol="0" anchor="ctr"/>
+                <a:lstStyle/>
+                <a:p>
+                  <a:pPr algn="ctr"/>
+                  <a:endParaRPr lang="en-US">
+                    <a:latin typeface="Patron" panose="00000500000000000000" pitchFamily="50" charset="0"/>
+                  </a:endParaRPr>
+                </a:p>
+              </p:txBody>
+            </p:sp>
+          </p:grpSp>
+        </p:grpSp>
+        <p:grpSp>
+          <p:nvGrpSpPr>
+            <p:cNvPr id="52" name="Group 51">
+              <a:extLst>
+                <a:ext uri="{FF2B5EF4-FFF2-40B4-BE49-F238E27FC236}">
+                  <a16:creationId xmlns:a16="http://schemas.microsoft.com/office/drawing/2014/main" id="{0228636C-AB81-4D42-8160-47A59465EAFD}"/>
+                </a:ext>
+              </a:extLst>
+            </p:cNvPr>
+            <p:cNvGrpSpPr/>
+            <p:nvPr/>
+          </p:nvGrpSpPr>
+          <p:grpSpPr>
+            <a:xfrm>
+              <a:off x="4702629" y="2815406"/>
+              <a:ext cx="6244481" cy="1521517"/>
+              <a:chOff x="4702629" y="2815406"/>
+              <a:chExt cx="6244481" cy="1521517"/>
+            </a:xfrm>
+          </p:grpSpPr>
+          <p:sp>
+            <p:nvSpPr>
+              <p:cNvPr id="65" name="Rectangle: Rounded Corners 64">
+                <a:extLst>
+                  <a:ext uri="{FF2B5EF4-FFF2-40B4-BE49-F238E27FC236}">
+                    <a16:creationId xmlns:a16="http://schemas.microsoft.com/office/drawing/2014/main" id="{B4D2CA71-93F4-42B4-8EB0-4EAFC6617C7D}"/>
+                  </a:ext>
+                </a:extLst>
+              </p:cNvPr>
+              <p:cNvSpPr/>
+              <p:nvPr/>
+            </p:nvSpPr>
+            <p:spPr>
+              <a:xfrm>
+                <a:off x="4702629" y="2815406"/>
+                <a:ext cx="6244481" cy="1521517"/>
+              </a:xfrm>
+              <a:prstGeom prst="roundRect">
+                <a:avLst>
+                  <a:gd name="adj" fmla="val 3188"/>
+                </a:avLst>
+              </a:prstGeom>
+              <a:noFill/>
+              <a:ln w="25400">
+                <a:solidFill>
+                  <a:srgbClr val="00B0F0"/>
+                </a:solidFill>
+                <a:prstDash val="sysDot"/>
+              </a:ln>
+            </p:spPr>
+            <p:style>
+              <a:lnRef idx="2">
+                <a:schemeClr val="accent1">
+                  <a:shade val="50000"/>
+                </a:schemeClr>
+              </a:lnRef>
+              <a:fillRef idx="1">
+                <a:schemeClr val="accent1"/>
+              </a:fillRef>
+              <a:effectRef idx="0">
+                <a:schemeClr val="accent1"/>
+              </a:effectRef>
+              <a:fontRef idx="minor">
+                <a:schemeClr val="lt1"/>
+              </a:fontRef>
+            </p:style>
+            <p:txBody>
+              <a:bodyPr rtlCol="0" anchor="ctr"/>
+              <a:lstStyle/>
+              <a:p>
+                <a:pPr algn="ctr"/>
+                <a:endParaRPr lang="en-US">
+                  <a:latin typeface="Patron" panose="00000500000000000000" pitchFamily="50" charset="0"/>
+                </a:endParaRPr>
+              </a:p>
+            </p:txBody>
+          </p:sp>
+          <p:sp>
+            <p:nvSpPr>
+              <p:cNvPr id="66" name="TextBox 65">
+                <a:extLst>
+                  <a:ext uri="{FF2B5EF4-FFF2-40B4-BE49-F238E27FC236}">
+                    <a16:creationId xmlns:a16="http://schemas.microsoft.com/office/drawing/2014/main" id="{273D8782-416E-4BEC-A5DC-E55216EF4BA3}"/>
+                  </a:ext>
+                </a:extLst>
+              </p:cNvPr>
+              <p:cNvSpPr txBox="1"/>
+              <p:nvPr/>
+            </p:nvSpPr>
+            <p:spPr>
+              <a:xfrm>
+                <a:off x="4813040" y="2902356"/>
+                <a:ext cx="1197764" cy="284693"/>
+              </a:xfrm>
+              <a:prstGeom prst="rect">
+                <a:avLst/>
+              </a:prstGeom>
+              <a:solidFill>
+                <a:schemeClr val="lt1"/>
+              </a:solidFill>
+            </p:spPr>
+            <p:txBody>
+              <a:bodyPr wrap="none" rtlCol="0">
+                <a:spAutoFit/>
+              </a:bodyPr>
+              <a:lstStyle/>
+              <a:p>
+                <a:r>
+                  <a:rPr lang="en-US" sz="1250" dirty="0">
+                    <a:latin typeface="Patron" panose="00000500000000000000" pitchFamily="50" charset="0"/>
+                    <a:ea typeface="Open Sans" panose="020B0606030504020204" pitchFamily="34" charset="0"/>
+                    <a:cs typeface="Open Sans" panose="020B0606030504020204" pitchFamily="34" charset="0"/>
+                  </a:rPr>
+                  <a:t>Namespace 2</a:t>
+                </a:r>
+              </a:p>
+            </p:txBody>
+          </p:sp>
+          <p:grpSp>
+            <p:nvGrpSpPr>
+              <p:cNvPr id="67" name="Group 66">
+                <a:extLst>
+                  <a:ext uri="{FF2B5EF4-FFF2-40B4-BE49-F238E27FC236}">
+                    <a16:creationId xmlns:a16="http://schemas.microsoft.com/office/drawing/2014/main" id="{5909D9A9-A1BC-4E05-AAC2-4602B80DDACB}"/>
+                  </a:ext>
+                </a:extLst>
+              </p:cNvPr>
+              <p:cNvGrpSpPr/>
+              <p:nvPr/>
+            </p:nvGrpSpPr>
+            <p:grpSpPr>
+              <a:xfrm>
+                <a:off x="9041363" y="3539542"/>
+                <a:ext cx="1662858" cy="581163"/>
+                <a:chOff x="1109050" y="1302512"/>
+                <a:chExt cx="2110966" cy="582440"/>
+              </a:xfrm>
+            </p:grpSpPr>
+            <p:sp>
+              <p:nvSpPr>
+                <p:cNvPr id="68" name="Rectangle: Rounded Corners 67">
+                  <a:extLst>
+                    <a:ext uri="{FF2B5EF4-FFF2-40B4-BE49-F238E27FC236}">
+                      <a16:creationId xmlns:a16="http://schemas.microsoft.com/office/drawing/2014/main" id="{0890274C-CD19-4EA5-9914-E08329317F0D}"/>
+                    </a:ext>
+                  </a:extLst>
+                </p:cNvPr>
+                <p:cNvSpPr/>
+                <p:nvPr/>
+              </p:nvSpPr>
+              <p:spPr>
+                <a:xfrm>
+                  <a:off x="1182986" y="1375174"/>
+                  <a:ext cx="2012887" cy="475071"/>
+                </a:xfrm>
+                <a:prstGeom prst="roundRect">
+                  <a:avLst>
+                    <a:gd name="adj" fmla="val 7774"/>
+                  </a:avLst>
+                </a:prstGeom>
+                <a:solidFill>
+                  <a:schemeClr val="accent3">
+                    <a:alpha val="71000"/>
+                  </a:schemeClr>
+                </a:solidFill>
+                <a:ln>
+                  <a:noFill/>
+                </a:ln>
+              </p:spPr>
+              <p:style>
+                <a:lnRef idx="2">
+                  <a:schemeClr val="accent1">
+                    <a:shade val="50000"/>
+                  </a:schemeClr>
+                </a:lnRef>
+                <a:fillRef idx="1">
+                  <a:schemeClr val="accent1"/>
+                </a:fillRef>
+                <a:effectRef idx="0">
+                  <a:schemeClr val="accent1"/>
+                </a:effectRef>
+                <a:fontRef idx="minor">
+                  <a:schemeClr val="lt1"/>
+                </a:fontRef>
+              </p:style>
+              <p:txBody>
+                <a:bodyPr rtlCol="0" anchor="ctr"/>
+                <a:lstStyle/>
+                <a:p>
+                  <a:pPr algn="ctr"/>
+                  <a:r>
+                    <a:rPr lang="en-US" sz="1000" dirty="0">
+                      <a:solidFill>
+                        <a:schemeClr val="tx1"/>
+                      </a:solidFill>
+                      <a:latin typeface="Patron" panose="00000500000000000000" pitchFamily="50" charset="0"/>
+                      <a:ea typeface="Open Sans" panose="020B0606030504020204" pitchFamily="34" charset="0"/>
+                      <a:cs typeface="Open Sans" panose="020B0606030504020204" pitchFamily="34" charset="0"/>
+                    </a:rPr>
+                    <a:t>Production</a:t>
+                  </a:r>
+                </a:p>
+              </p:txBody>
+            </p:sp>
+            <p:sp>
+              <p:nvSpPr>
+                <p:cNvPr id="69" name="Rectangle: Rounded Corners 68">
+                  <a:extLst>
+                    <a:ext uri="{FF2B5EF4-FFF2-40B4-BE49-F238E27FC236}">
+                      <a16:creationId xmlns:a16="http://schemas.microsoft.com/office/drawing/2014/main" id="{0FFD9F82-6C42-4490-A166-826236E2594B}"/>
+                    </a:ext>
+                  </a:extLst>
+                </p:cNvPr>
+                <p:cNvSpPr/>
+                <p:nvPr/>
+              </p:nvSpPr>
+              <p:spPr>
+                <a:xfrm>
+                  <a:off x="1109050" y="1302512"/>
+                  <a:ext cx="2110966" cy="582440"/>
+                </a:xfrm>
+                <a:prstGeom prst="roundRect">
+                  <a:avLst>
+                    <a:gd name="adj" fmla="val 11591"/>
+                  </a:avLst>
+                </a:prstGeom>
+                <a:noFill/>
+                <a:ln w="25400">
+                  <a:solidFill>
+                    <a:schemeClr val="tx1"/>
+                  </a:solidFill>
+                </a:ln>
+              </p:spPr>
+              <p:style>
+                <a:lnRef idx="2">
+                  <a:schemeClr val="accent1">
+                    <a:shade val="50000"/>
+                  </a:schemeClr>
+                </a:lnRef>
+                <a:fillRef idx="1">
+                  <a:schemeClr val="accent1"/>
+                </a:fillRef>
+                <a:effectRef idx="0">
+                  <a:schemeClr val="accent1"/>
+                </a:effectRef>
+                <a:fontRef idx="minor">
+                  <a:schemeClr val="lt1"/>
+                </a:fontRef>
+              </p:style>
+              <p:txBody>
+                <a:bodyPr rtlCol="0" anchor="ctr"/>
+                <a:lstStyle/>
+                <a:p>
+                  <a:pPr algn="ctr"/>
+                  <a:endParaRPr lang="en-US">
+                    <a:latin typeface="Patron" panose="00000500000000000000" pitchFamily="50" charset="0"/>
+                  </a:endParaRPr>
+                </a:p>
+              </p:txBody>
+            </p:sp>
+          </p:grpSp>
+          <p:grpSp>
+            <p:nvGrpSpPr>
+              <p:cNvPr id="73" name="Group 72">
+                <a:extLst>
+                  <a:ext uri="{FF2B5EF4-FFF2-40B4-BE49-F238E27FC236}">
+                    <a16:creationId xmlns:a16="http://schemas.microsoft.com/office/drawing/2014/main" id="{2D05C6ED-B9E7-4CF7-8EFD-EEB2411EFAB9}"/>
+                  </a:ext>
+                </a:extLst>
+              </p:cNvPr>
+              <p:cNvGrpSpPr/>
+              <p:nvPr/>
+            </p:nvGrpSpPr>
+            <p:grpSpPr>
+              <a:xfrm>
+                <a:off x="6992289" y="3539541"/>
+                <a:ext cx="1662858" cy="581164"/>
+                <a:chOff x="1109050" y="1302512"/>
+                <a:chExt cx="2110966" cy="582440"/>
+              </a:xfrm>
+            </p:grpSpPr>
+            <p:sp>
+              <p:nvSpPr>
+                <p:cNvPr id="74" name="Rectangle: Rounded Corners 73">
+                  <a:extLst>
+                    <a:ext uri="{FF2B5EF4-FFF2-40B4-BE49-F238E27FC236}">
+                      <a16:creationId xmlns:a16="http://schemas.microsoft.com/office/drawing/2014/main" id="{7B1282EF-300F-4F99-A37F-D9D3D1440376}"/>
+                    </a:ext>
+                  </a:extLst>
+                </p:cNvPr>
+                <p:cNvSpPr/>
+                <p:nvPr/>
+              </p:nvSpPr>
+              <p:spPr>
+                <a:xfrm>
+                  <a:off x="1182986" y="1375174"/>
+                  <a:ext cx="2012887" cy="475071"/>
+                </a:xfrm>
+                <a:prstGeom prst="roundRect">
+                  <a:avLst>
+                    <a:gd name="adj" fmla="val 7774"/>
+                  </a:avLst>
+                </a:prstGeom>
+                <a:solidFill>
+                  <a:schemeClr val="accent6">
+                    <a:alpha val="71000"/>
+                  </a:schemeClr>
+                </a:solidFill>
+                <a:ln>
+                  <a:noFill/>
+                </a:ln>
+              </p:spPr>
+              <p:style>
+                <a:lnRef idx="2">
+                  <a:schemeClr val="accent1">
+                    <a:shade val="50000"/>
+                  </a:schemeClr>
+                </a:lnRef>
+                <a:fillRef idx="1">
+                  <a:schemeClr val="accent1"/>
+                </a:fillRef>
+                <a:effectRef idx="0">
+                  <a:schemeClr val="accent1"/>
+                </a:effectRef>
+                <a:fontRef idx="minor">
+                  <a:schemeClr val="lt1"/>
+                </a:fontRef>
+              </p:style>
+              <p:txBody>
+                <a:bodyPr rtlCol="0" anchor="ctr"/>
+                <a:lstStyle/>
+                <a:p>
+                  <a:pPr algn="ctr"/>
+                  <a:r>
+                    <a:rPr lang="en-US" sz="1000" dirty="0">
+                      <a:solidFill>
+                        <a:schemeClr val="tx1"/>
+                      </a:solidFill>
+                      <a:latin typeface="Patron" panose="00000500000000000000" pitchFamily="50" charset="0"/>
+                      <a:ea typeface="Open Sans" panose="020B0606030504020204" pitchFamily="34" charset="0"/>
+                      <a:cs typeface="Open Sans" panose="020B0606030504020204" pitchFamily="34" charset="0"/>
+                    </a:rPr>
+                    <a:t>Operator</a:t>
+                  </a:r>
+                </a:p>
+              </p:txBody>
+            </p:sp>
+            <p:sp>
+              <p:nvSpPr>
+                <p:cNvPr id="75" name="Rectangle: Rounded Corners 74">
+                  <a:extLst>
+                    <a:ext uri="{FF2B5EF4-FFF2-40B4-BE49-F238E27FC236}">
+                      <a16:creationId xmlns:a16="http://schemas.microsoft.com/office/drawing/2014/main" id="{88738058-AEA8-428F-8BE6-99A90B63AEEF}"/>
+                    </a:ext>
+                  </a:extLst>
+                </p:cNvPr>
+                <p:cNvSpPr/>
+                <p:nvPr/>
+              </p:nvSpPr>
+              <p:spPr>
+                <a:xfrm>
+                  <a:off x="1109050" y="1302512"/>
+                  <a:ext cx="2110966" cy="582440"/>
+                </a:xfrm>
+                <a:prstGeom prst="roundRect">
+                  <a:avLst>
+                    <a:gd name="adj" fmla="val 11591"/>
+                  </a:avLst>
+                </a:prstGeom>
+                <a:noFill/>
+                <a:ln w="25400">
+                  <a:solidFill>
+                    <a:schemeClr val="tx1"/>
+                  </a:solidFill>
+                </a:ln>
+              </p:spPr>
+              <p:style>
+                <a:lnRef idx="2">
+                  <a:schemeClr val="accent1">
+                    <a:shade val="50000"/>
+                  </a:schemeClr>
+                </a:lnRef>
+                <a:fillRef idx="1">
+                  <a:schemeClr val="accent1"/>
+                </a:fillRef>
+                <a:effectRef idx="0">
+                  <a:schemeClr val="accent1"/>
+                </a:effectRef>
+                <a:fontRef idx="minor">
+                  <a:schemeClr val="lt1"/>
+                </a:fontRef>
+              </p:style>
+              <p:txBody>
+                <a:bodyPr rtlCol="0" anchor="ctr"/>
+                <a:lstStyle/>
+                <a:p>
+                  <a:pPr algn="ctr"/>
+                  <a:endParaRPr lang="en-US">
+                    <a:latin typeface="Patron" panose="00000500000000000000" pitchFamily="50" charset="0"/>
+                  </a:endParaRPr>
+                </a:p>
+              </p:txBody>
+            </p:sp>
+          </p:grpSp>
+          <p:grpSp>
+            <p:nvGrpSpPr>
+              <p:cNvPr id="79" name="Group 78">
+                <a:extLst>
+                  <a:ext uri="{FF2B5EF4-FFF2-40B4-BE49-F238E27FC236}">
+                    <a16:creationId xmlns:a16="http://schemas.microsoft.com/office/drawing/2014/main" id="{41A2F967-2D25-4312-8C64-410AB8A403EB}"/>
+                  </a:ext>
+                </a:extLst>
+              </p:cNvPr>
+              <p:cNvGrpSpPr/>
+              <p:nvPr/>
+            </p:nvGrpSpPr>
+            <p:grpSpPr>
+              <a:xfrm>
+                <a:off x="4906447" y="3539541"/>
+                <a:ext cx="1662858" cy="581164"/>
+                <a:chOff x="1109050" y="1302512"/>
+                <a:chExt cx="2110966" cy="582440"/>
+              </a:xfrm>
+            </p:grpSpPr>
+            <p:sp>
+              <p:nvSpPr>
+                <p:cNvPr id="80" name="Rectangle: Rounded Corners 79">
+                  <a:extLst>
+                    <a:ext uri="{FF2B5EF4-FFF2-40B4-BE49-F238E27FC236}">
+                      <a16:creationId xmlns:a16="http://schemas.microsoft.com/office/drawing/2014/main" id="{277CC8FE-8759-4A01-81DE-1A45AC1D24F6}"/>
+                    </a:ext>
+                  </a:extLst>
+                </p:cNvPr>
+                <p:cNvSpPr/>
+                <p:nvPr/>
+              </p:nvSpPr>
+              <p:spPr>
+                <a:xfrm>
+                  <a:off x="1182986" y="1375174"/>
+                  <a:ext cx="2012887" cy="475071"/>
+                </a:xfrm>
+                <a:prstGeom prst="roundRect">
+                  <a:avLst>
+                    <a:gd name="adj" fmla="val 7774"/>
+                  </a:avLst>
+                </a:prstGeom>
+                <a:solidFill>
+                  <a:schemeClr val="accent1">
+                    <a:alpha val="71000"/>
+                  </a:schemeClr>
+                </a:solidFill>
+                <a:ln>
+                  <a:noFill/>
+                </a:ln>
+              </p:spPr>
+              <p:style>
+                <a:lnRef idx="2">
+                  <a:schemeClr val="accent1">
+                    <a:shade val="50000"/>
+                  </a:schemeClr>
+                </a:lnRef>
+                <a:fillRef idx="1">
+                  <a:schemeClr val="accent1"/>
+                </a:fillRef>
+                <a:effectRef idx="0">
+                  <a:schemeClr val="accent1"/>
+                </a:effectRef>
+                <a:fontRef idx="minor">
+                  <a:schemeClr val="lt1"/>
+                </a:fontRef>
+              </p:style>
+              <p:txBody>
+                <a:bodyPr rtlCol="0" anchor="ctr"/>
+                <a:lstStyle/>
+                <a:p>
+                  <a:pPr algn="ctr"/>
+                  <a:r>
+                    <a:rPr lang="en-US" sz="1000" dirty="0">
+                      <a:solidFill>
+                        <a:schemeClr val="tx1"/>
+                      </a:solidFill>
+                      <a:latin typeface="Patron" panose="00000500000000000000" pitchFamily="50" charset="0"/>
+                      <a:ea typeface="Open Sans" panose="020B0606030504020204" pitchFamily="34" charset="0"/>
+                      <a:cs typeface="Open Sans" panose="020B0606030504020204" pitchFamily="34" charset="0"/>
+                    </a:rPr>
+                    <a:t>Gateway</a:t>
+                  </a:r>
+                </a:p>
+              </p:txBody>
+            </p:sp>
+            <p:sp>
+              <p:nvSpPr>
+                <p:cNvPr id="81" name="Rectangle: Rounded Corners 80">
+                  <a:extLst>
+                    <a:ext uri="{FF2B5EF4-FFF2-40B4-BE49-F238E27FC236}">
+                      <a16:creationId xmlns:a16="http://schemas.microsoft.com/office/drawing/2014/main" id="{B4B9BBEA-8A4B-4D14-BC90-2C00156AB1AE}"/>
+                    </a:ext>
+                  </a:extLst>
+                </p:cNvPr>
+                <p:cNvSpPr/>
+                <p:nvPr/>
+              </p:nvSpPr>
+              <p:spPr>
+                <a:xfrm>
+                  <a:off x="1109050" y="1302512"/>
+                  <a:ext cx="2110966" cy="582440"/>
+                </a:xfrm>
+                <a:prstGeom prst="roundRect">
+                  <a:avLst>
+                    <a:gd name="adj" fmla="val 11591"/>
+                  </a:avLst>
+                </a:prstGeom>
+                <a:noFill/>
+                <a:ln w="25400">
+                  <a:solidFill>
+                    <a:schemeClr val="tx1"/>
+                  </a:solidFill>
+                </a:ln>
+              </p:spPr>
+              <p:style>
+                <a:lnRef idx="2">
+                  <a:schemeClr val="accent1">
+                    <a:shade val="50000"/>
+                  </a:schemeClr>
+                </a:lnRef>
+                <a:fillRef idx="1">
+                  <a:schemeClr val="accent1"/>
+                </a:fillRef>
+                <a:effectRef idx="0">
+                  <a:schemeClr val="accent1"/>
+                </a:effectRef>
+                <a:fontRef idx="minor">
+                  <a:schemeClr val="lt1"/>
+                </a:fontRef>
+              </p:style>
+              <p:txBody>
+                <a:bodyPr rtlCol="0" anchor="ctr"/>
+                <a:lstStyle/>
+                <a:p>
+                  <a:pPr algn="ctr"/>
+                  <a:endParaRPr lang="en-US">
+                    <a:latin typeface="Patron" panose="00000500000000000000" pitchFamily="50" charset="0"/>
+                  </a:endParaRPr>
+                </a:p>
+              </p:txBody>
+            </p:sp>
+          </p:grpSp>
+        </p:grpSp>
+      </p:grpSp>
+      <p:cxnSp>
+        <p:nvCxnSpPr>
+          <p:cNvPr id="3" name="Connector: Elbow 2">
+            <a:extLst>
+              <a:ext uri="{FF2B5EF4-FFF2-40B4-BE49-F238E27FC236}">
+                <a16:creationId xmlns:a16="http://schemas.microsoft.com/office/drawing/2014/main" id="{5425C1A7-2760-42B4-AD56-A6B950C13665}"/>
+              </a:ext>
+            </a:extLst>
+          </p:cNvPr>
+          <p:cNvCxnSpPr>
+            <a:stCxn id="8" idx="3"/>
+            <a:endCxn id="78" idx="1"/>
+          </p:cNvCxnSpPr>
+          <p:nvPr/>
+        </p:nvCxnSpPr>
+        <p:spPr>
+          <a:xfrm>
+            <a:off x="3051368" y="1442723"/>
+            <a:ext cx="1855079" cy="384953"/>
+          </a:xfrm>
+          <a:prstGeom prst="bentConnector3">
+            <a:avLst/>
+          </a:prstGeom>
+          <a:ln>
+            <a:tailEnd type="triangle"/>
+          </a:ln>
+        </p:spPr>
+        <p:style>
+          <a:lnRef idx="3">
+            <a:schemeClr val="dk1"/>
+          </a:lnRef>
+          <a:fillRef idx="0">
+            <a:schemeClr val="dk1"/>
+          </a:fillRef>
+          <a:effectRef idx="2">
+            <a:schemeClr val="dk1"/>
+          </a:effectRef>
+          <a:fontRef idx="minor">
+            <a:schemeClr val="tx1"/>
+          </a:fontRef>
+        </p:style>
+      </p:cxnSp>
+      <p:cxnSp>
+        <p:nvCxnSpPr>
+          <p:cNvPr id="84" name="Connector: Elbow 83">
+            <a:extLst>
+              <a:ext uri="{FF2B5EF4-FFF2-40B4-BE49-F238E27FC236}">
+                <a16:creationId xmlns:a16="http://schemas.microsoft.com/office/drawing/2014/main" id="{688BD78E-F0F6-4B73-B4D2-11ED9E7E96E6}"/>
+              </a:ext>
+            </a:extLst>
+          </p:cNvPr>
+          <p:cNvCxnSpPr>
+            <a:cxnSpLocks/>
+            <a:stCxn id="16" idx="3"/>
+            <a:endCxn id="78" idx="1"/>
+          </p:cNvCxnSpPr>
+          <p:nvPr/>
+        </p:nvCxnSpPr>
+        <p:spPr>
+          <a:xfrm flipV="1">
+            <a:off x="3051368" y="1827676"/>
+            <a:ext cx="1855079" cy="808980"/>
+          </a:xfrm>
+          <a:prstGeom prst="bentConnector3">
+            <a:avLst/>
+          </a:prstGeom>
+          <a:ln>
+            <a:tailEnd type="triangle"/>
+          </a:ln>
+        </p:spPr>
+        <p:style>
+          <a:lnRef idx="3">
+            <a:schemeClr val="dk1"/>
+          </a:lnRef>
+          <a:fillRef idx="0">
+            <a:schemeClr val="dk1"/>
+          </a:fillRef>
+          <a:effectRef idx="2">
+            <a:schemeClr val="dk1"/>
+          </a:effectRef>
+          <a:fontRef idx="minor">
+            <a:schemeClr val="tx1"/>
+          </a:fontRef>
+        </p:style>
+      </p:cxnSp>
+      <p:cxnSp>
+        <p:nvCxnSpPr>
+          <p:cNvPr id="88" name="Connector: Elbow 87">
+            <a:extLst>
+              <a:ext uri="{FF2B5EF4-FFF2-40B4-BE49-F238E27FC236}">
+                <a16:creationId xmlns:a16="http://schemas.microsoft.com/office/drawing/2014/main" id="{7FF38896-49D9-42C6-9190-7C2EA1AE7FE5}"/>
+              </a:ext>
+            </a:extLst>
+          </p:cNvPr>
+          <p:cNvCxnSpPr>
+            <a:cxnSpLocks/>
+          </p:cNvCxnSpPr>
+          <p:nvPr/>
+        </p:nvCxnSpPr>
+        <p:spPr>
+          <a:xfrm>
+            <a:off x="3051368" y="3823773"/>
+            <a:ext cx="1855079" cy="12700"/>
+          </a:xfrm>
+          <a:prstGeom prst="bentConnector3">
+            <a:avLst>
+              <a:gd name="adj1" fmla="val -298"/>
+            </a:avLst>
+          </a:prstGeom>
+          <a:ln>
+            <a:tailEnd type="triangle"/>
+          </a:ln>
+        </p:spPr>
+        <p:style>
+          <a:lnRef idx="3">
+            <a:schemeClr val="dk1"/>
+          </a:lnRef>
+          <a:fillRef idx="0">
+            <a:schemeClr val="dk1"/>
+          </a:fillRef>
+          <a:effectRef idx="2">
+            <a:schemeClr val="dk1"/>
+          </a:effectRef>
+          <a:fontRef idx="minor">
+            <a:schemeClr val="tx1"/>
+          </a:fontRef>
+        </p:style>
+      </p:cxnSp>
+    </p:spTree>
+    <p:extLst>
+      <p:ext uri="{BB962C8B-B14F-4D97-AF65-F5344CB8AC3E}">
+        <p14:creationId xmlns:p14="http://schemas.microsoft.com/office/powerpoint/2010/main" val="2368400465"/>
+      </p:ext>
+    </p:extLst>
+  </p:cSld>
+  <p:clrMapOvr>
+    <a:masterClrMapping/>
+  </p:clrMapOvr>
+</p:sld>
+</file>
+
 <file path=ppt/theme/theme1.xml><?xml version="1.0" encoding="utf-8"?>
 <a:theme xmlns:a="http://schemas.openxmlformats.org/drawingml/2006/main" name="Office Theme">
   <a:themeElements>
-    <a:clrScheme name="Office">
+    <a:clrScheme name="Mendix Presentation">
       <a:dk1>
-        <a:sysClr val="windowText" lastClr="000000"/>
+        <a:srgbClr val="FFFFFF"/>
       </a:dk1>
       <a:lt1>
-        <a:sysClr val="window" lastClr="FFFFFF"/>
+        <a:srgbClr val="000000"/>
       </a:lt1>
       <a:dk2>
-        <a:srgbClr val="44546A"/>
+        <a:srgbClr val="FFFFFF"/>
       </a:dk2>
       <a:lt2>
-        <a:srgbClr val="E7E6E6"/>
+        <a:srgbClr val="000000"/>
       </a:lt2>
       <a:accent1>
-        <a:srgbClr val="4472C4"/>
+        <a:srgbClr val="0CABF9"/>
       </a:accent1>
       <a:accent2>
-        <a:srgbClr val="ED7D31"/>
+        <a:srgbClr val="0627E8"/>
       </a:accent2>
       <a:accent3>
-        <a:srgbClr val="A5A5A5"/>
+        <a:srgbClr val="45CE61"/>
       </a:accent3>
       <a:accent4>
-        <a:srgbClr val="FFC000"/>
+        <a:srgbClr val="6750FF"/>
       </a:accent4>
       <a:accent5>
-        <a:srgbClr val="5B9BD5"/>
+        <a:srgbClr val="FF6161"/>
       </a:accent5>
       <a:accent6>
-        <a:srgbClr val="70AD47"/>
+        <a:srgbClr val="FACA49"/>
       </a:accent6>
       <a:hlink>
-        <a:srgbClr val="0563C1"/>
+        <a:srgbClr val="0CABF9"/>
       </a:hlink>
       <a:folHlink>
-        <a:srgbClr val="954F72"/>
+        <a:srgbClr val="0CABF9"/>
       </a:folHlink>
     </a:clrScheme>
     <a:fontScheme name="Office">

</xml_diff>